<commit_message>
update pptxt 2nd time
</commit_message>
<xml_diff>
--- a/fuzz-testing-experience.pptx
+++ b/fuzz-testing-experience.pptx
@@ -205,7 +205,7 @@
             <a:fld id="{85819EA1-2561-48F0-8983-025987A638B1}" type="datetimeFigureOut">
               <a:rPr lang="en-US" smtClean="0"/>
               <a:pPr/>
-              <a:t>9/13/2012</a:t>
+              <a:t>10/16/2012</a:t>
             </a:fld>
             <a:endParaRPr lang="en-US"/>
           </a:p>
@@ -653,7 +653,7 @@
             <a:fld id="{C5F5CB8E-CB40-4A03-A6AC-3ABA38A1FB65}" type="datetime1">
               <a:rPr lang="en-US" smtClean="0"/>
               <a:pPr/>
-              <a:t>9/13/2012</a:t>
+              <a:t>10/16/2012</a:t>
             </a:fld>
             <a:endParaRPr lang="en-US"/>
           </a:p>
@@ -820,7 +820,7 @@
             <a:fld id="{06DD4719-5C43-4984-AFF3-F5E0AF5FF031}" type="datetime1">
               <a:rPr lang="en-US" smtClean="0"/>
               <a:pPr/>
-              <a:t>9/13/2012</a:t>
+              <a:t>10/16/2012</a:t>
             </a:fld>
             <a:endParaRPr lang="en-US"/>
           </a:p>
@@ -997,7 +997,7 @@
             <a:fld id="{CC7A5DD6-BDC8-49A4-92D4-52D389ED7127}" type="datetime1">
               <a:rPr lang="en-US" smtClean="0"/>
               <a:pPr/>
-              <a:t>9/13/2012</a:t>
+              <a:t>10/16/2012</a:t>
             </a:fld>
             <a:endParaRPr lang="en-US"/>
           </a:p>
@@ -1164,7 +1164,7 @@
             <a:fld id="{4F14D063-41DD-48AB-A602-039008C581E1}" type="datetime1">
               <a:rPr lang="en-US" smtClean="0"/>
               <a:pPr/>
-              <a:t>9/13/2012</a:t>
+              <a:t>10/16/2012</a:t>
             </a:fld>
             <a:endParaRPr lang="en-US"/>
           </a:p>
@@ -1407,7 +1407,7 @@
             <a:fld id="{068E4978-1557-452E-A239-116EC6F51CD7}" type="datetime1">
               <a:rPr lang="en-US" smtClean="0"/>
               <a:pPr/>
-              <a:t>9/13/2012</a:t>
+              <a:t>10/16/2012</a:t>
             </a:fld>
             <a:endParaRPr lang="en-US"/>
           </a:p>
@@ -1692,7 +1692,7 @@
             <a:fld id="{83B9F869-A416-4F5C-BA40-A86744E2E6EE}" type="datetime1">
               <a:rPr lang="en-US" smtClean="0"/>
               <a:pPr/>
-              <a:t>9/13/2012</a:t>
+              <a:t>10/16/2012</a:t>
             </a:fld>
             <a:endParaRPr lang="en-US"/>
           </a:p>
@@ -2111,7 +2111,7 @@
             <a:fld id="{C9CB0562-3A00-462F-8503-2D2759CD71B3}" type="datetime1">
               <a:rPr lang="en-US" smtClean="0"/>
               <a:pPr/>
-              <a:t>9/13/2012</a:t>
+              <a:t>10/16/2012</a:t>
             </a:fld>
             <a:endParaRPr lang="en-US"/>
           </a:p>
@@ -2226,7 +2226,7 @@
             <a:fld id="{7F8BCDD0-87F9-4EFA-8F1A-54A1AE573F8D}" type="datetime1">
               <a:rPr lang="en-US" smtClean="0"/>
               <a:pPr/>
-              <a:t>9/13/2012</a:t>
+              <a:t>10/16/2012</a:t>
             </a:fld>
             <a:endParaRPr lang="en-US"/>
           </a:p>
@@ -2318,7 +2318,7 @@
             <a:fld id="{1FA54157-3739-4265-B849-0583E75E80F3}" type="datetime1">
               <a:rPr lang="en-US" smtClean="0"/>
               <a:pPr/>
-              <a:t>9/13/2012</a:t>
+              <a:t>10/16/2012</a:t>
             </a:fld>
             <a:endParaRPr lang="en-US"/>
           </a:p>
@@ -2592,7 +2592,7 @@
             <a:fld id="{C4CD6D42-6DCA-48D6-946B-65388258CEB1}" type="datetime1">
               <a:rPr lang="en-US" smtClean="0"/>
               <a:pPr/>
-              <a:t>9/13/2012</a:t>
+              <a:t>10/16/2012</a:t>
             </a:fld>
             <a:endParaRPr lang="en-US"/>
           </a:p>
@@ -2842,7 +2842,7 @@
             <a:fld id="{9BF29E51-F3F9-4CCB-9E94-E0AD7A058BD8}" type="datetime1">
               <a:rPr lang="en-US" smtClean="0"/>
               <a:pPr/>
-              <a:t>9/13/2012</a:t>
+              <a:t>10/16/2012</a:t>
             </a:fld>
             <a:endParaRPr lang="en-US"/>
           </a:p>
@@ -3052,7 +3052,7 @@
             <a:fld id="{453BA427-6D02-4C4E-AFE2-B5CDAFAAC174}" type="datetime1">
               <a:rPr lang="en-US" smtClean="0"/>
               <a:pPr/>
-              <a:t>9/13/2012</a:t>
+              <a:t>10/16/2012</a:t>
             </a:fld>
             <a:endParaRPr lang="en-US"/>
           </a:p>
@@ -3500,7 +3500,7 @@
             <a:fld id="{141B9BBC-7BEE-4B94-B219-64B364DFA0E0}" type="datetime1">
               <a:rPr lang="en-US" smtClean="0"/>
               <a:pPr/>
-              <a:t>9/13/2012</a:t>
+              <a:t>10/16/2012</a:t>
             </a:fld>
             <a:endParaRPr lang="en-US"/>
           </a:p>
@@ -3595,28 +3595,19 @@
           <a:p>
             <a:r>
               <a:rPr lang="en-US" dirty="0" smtClean="0"/>
-              <a:t>You can fuzz </a:t>
-            </a:r>
-            <a:r>
-              <a:rPr lang="en-US" dirty="0" smtClean="0"/>
-              <a:t>testing can find validation errors in production code.</a:t>
-            </a:r>
-          </a:p>
-          <a:p>
-            <a:r>
-              <a:rPr lang="en-US" dirty="0" smtClean="0"/>
-              <a:t>Remember to start </a:t>
-            </a:r>
-            <a:r>
-              <a:rPr lang="en-US" dirty="0" smtClean="0"/>
-              <a:t>small and simple.</a:t>
-            </a:r>
-            <a:endParaRPr lang="en-US" dirty="0" smtClean="0"/>
-          </a:p>
-          <a:p>
-            <a:r>
-              <a:rPr lang="en-US" dirty="0" smtClean="0"/>
-              <a:t>Watch the test run manually at the first. I expect you will see additional things to report like me.</a:t>
+              <a:t>You can fuzz testing can find validation errors in production code.</a:t>
+            </a:r>
+          </a:p>
+          <a:p>
+            <a:r>
+              <a:rPr lang="en-US" dirty="0" smtClean="0"/>
+              <a:t>Remember to start small and simple.</a:t>
+            </a:r>
+          </a:p>
+          <a:p>
+            <a:r>
+              <a:rPr lang="en-US" dirty="0" smtClean="0"/>
+              <a:t>Watch the test run manually at the first. I expect you will see additional things to report like I did.</a:t>
             </a:r>
             <a:endParaRPr lang="en-US" dirty="0"/>
           </a:p>
@@ -3640,7 +3631,7 @@
             <a:fld id="{E1D57E71-312C-43BA-B102-A183E82104A1}" type="datetime1">
               <a:rPr lang="en-US" smtClean="0"/>
               <a:pPr/>
-              <a:t>9/13/2012</a:t>
+              <a:t>10/16/2012</a:t>
             </a:fld>
             <a:endParaRPr lang="en-US"/>
           </a:p>
@@ -3897,7 +3888,7 @@
             <a:fld id="{0C3E0DB2-433B-48BC-9D94-71F1264DE3F8}" type="datetime1">
               <a:rPr lang="en-US" smtClean="0"/>
               <a:pPr/>
-              <a:t>9/13/2012</a:t>
+              <a:t>10/16/2012</a:t>
             </a:fld>
             <a:endParaRPr lang="en-US"/>
           </a:p>
@@ -4031,7 +4022,7 @@
             <a:fld id="{02F47C21-B119-4461-A571-C26484D83285}" type="datetime1">
               <a:rPr lang="en-US" smtClean="0"/>
               <a:pPr/>
-              <a:t>9/13/2012</a:t>
+              <a:t>10/16/2012</a:t>
             </a:fld>
             <a:endParaRPr lang="en-US"/>
           </a:p>
@@ -4129,12 +4120,6 @@
               <a:t>Remember 30-45 minute talk.</a:t>
             </a:r>
           </a:p>
-          <a:p>
-            <a:r>
-              <a:rPr lang="en-US" dirty="0" smtClean="0"/>
-              <a:t>Need MAC adaptor.</a:t>
-            </a:r>
-          </a:p>
         </p:txBody>
       </p:sp>
       <p:sp>
@@ -4155,7 +4140,7 @@
             <a:fld id="{54F0708F-76EF-42BC-85C1-C3965E163A61}" type="datetime1">
               <a:rPr lang="en-US" smtClean="0"/>
               <a:pPr/>
-              <a:t>9/13/2012</a:t>
+              <a:t>10/16/2012</a:t>
             </a:fld>
             <a:endParaRPr lang="en-US"/>
           </a:p>
@@ -4252,7 +4237,7 @@
           <a:p>
             <a:r>
               <a:rPr lang="en-US" dirty="0" smtClean="0"/>
-              <a:t>Took on-line Udacity course, Software Testing (CS258) – </a:t>
+              <a:t>Took on-line Udacity course, Software Testing (CS258) – Summer 2012 - </a:t>
             </a:r>
             <a:r>
               <a:rPr lang="en-US" dirty="0" smtClean="0">
@@ -4355,21 +4340,13 @@
           <a:p>
             <a:r>
               <a:rPr lang="en-US" dirty="0" smtClean="0"/>
-              <a:t>First experience with Python</a:t>
-            </a:r>
-          </a:p>
-          <a:p>
-            <a:r>
-              <a:rPr lang="en-US" dirty="0" smtClean="0"/>
-              <a:t>Next Class starts: Unknown, but you can go to previous class and just do </a:t>
-            </a:r>
-            <a:r>
-              <a:rPr lang="en-US" dirty="0" smtClean="0"/>
-              <a:t>the exercises</a:t>
-            </a:r>
-            <a:r>
-              <a:rPr lang="en-US" dirty="0" smtClean="0"/>
-              <a:t>.</a:t>
+              <a:t>First experience with Python ;o)</a:t>
+            </a:r>
+          </a:p>
+          <a:p>
+            <a:r>
+              <a:rPr lang="en-US" dirty="0" smtClean="0"/>
+              <a:t>Next Class starts: Unknown, but you can go to previous class and just do the exercises.</a:t>
             </a:r>
             <a:endParaRPr lang="en-US" dirty="0"/>
           </a:p>
@@ -4393,7 +4370,7 @@
             <a:fld id="{1710D5C2-DBCF-40E0-BBD6-2B1689DCDCB4}" type="datetime1">
               <a:rPr lang="en-US" smtClean="0"/>
               <a:pPr/>
-              <a:t>9/13/2012</a:t>
+              <a:t>10/16/2012</a:t>
             </a:fld>
             <a:endParaRPr lang="en-US"/>
           </a:p>
@@ -4493,7 +4470,7 @@
               <a:t>Modify (fuzz) one of the </a:t>
             </a:r>
             <a:r>
-              <a:rPr lang="en-US" dirty="0" smtClean="0"/>
+              <a:rPr lang="en-US" b="1" dirty="0" smtClean="0"/>
               <a:t>input files </a:t>
             </a:r>
             <a:r>
@@ -4561,7 +4538,7 @@
             <a:fld id="{C96261AF-507F-4D8F-991C-5A20C2F427B3}" type="datetime1">
               <a:rPr lang="en-US" smtClean="0"/>
               <a:pPr/>
-              <a:t>9/13/2012</a:t>
+              <a:t>10/16/2012</a:t>
             </a:fld>
             <a:endParaRPr lang="en-US"/>
           </a:p>
@@ -4657,12 +4634,16 @@
           <a:lstStyle/>
           <a:p>
             <a:r>
-              <a:rPr lang="en-US" b="1" dirty="0" smtClean="0"/>
+              <a:rPr lang="en-US" b="1" smtClean="0"/>
               <a:t>Watched</a:t>
             </a:r>
             <a:r>
-              <a:rPr lang="en-US" dirty="0" smtClean="0"/>
-              <a:t> the fuzz testing videos.</a:t>
+              <a:rPr lang="en-US" smtClean="0"/>
+              <a:t> Charlie Miller’s </a:t>
+            </a:r>
+            <a:r>
+              <a:rPr lang="en-US" dirty="0" smtClean="0"/>
+              <a:t>fuzz testing videos.</a:t>
             </a:r>
           </a:p>
           <a:p>
@@ -4743,7 +4724,7 @@
             <a:fld id="{C5111BBC-3E28-475A-9D49-AD009CE2513F}" type="datetime1">
               <a:rPr lang="en-US" smtClean="0"/>
               <a:pPr/>
-              <a:t>9/13/2012</a:t>
+              <a:t>10/16/2012</a:t>
             </a:fld>
             <a:endParaRPr lang="en-US"/>
           </a:p>
@@ -4815,11 +4796,7 @@
           <a:p>
             <a:r>
               <a:rPr lang="en-US" dirty="0" smtClean="0"/>
-              <a:t>Fuzzing Freemind </a:t>
-            </a:r>
-            <a:r>
-              <a:rPr lang="en-US" dirty="0" smtClean="0"/>
-              <a:t>- Code</a:t>
+              <a:t>Fuzzing Freemind - Code</a:t>
             </a:r>
             <a:endParaRPr lang="en-US" dirty="0"/>
           </a:p>
@@ -4844,23 +4821,7 @@
           <a:p>
             <a:r>
               <a:rPr lang="en-US" dirty="0" smtClean="0"/>
-              <a:t>Started creating the </a:t>
-            </a:r>
-            <a:r>
-              <a:rPr lang="en-US" dirty="0" smtClean="0"/>
-              <a:t>Python code </a:t>
-            </a:r>
-            <a:r>
-              <a:rPr lang="en-US" dirty="0" smtClean="0"/>
-              <a:t>based on example in course video. Later added</a:t>
-            </a:r>
-            <a:r>
-              <a:rPr lang="en-US" dirty="0" smtClean="0"/>
-              <a:t>/ modified </a:t>
-            </a:r>
-            <a:r>
-              <a:rPr lang="en-US" dirty="0" smtClean="0"/>
-              <a:t>code based on studying others’ code.</a:t>
+              <a:t>Started creating the Python code based on example in course video. Later added/ modified code based on studying others’ code.</a:t>
             </a:r>
           </a:p>
           <a:p>
@@ -4927,7 +4888,7 @@
             <a:fld id="{D152BC2E-9D3A-4014-BF4E-5A5779F9B034}" type="datetime1">
               <a:rPr lang="en-US" smtClean="0"/>
               <a:pPr/>
-              <a:t>9/13/2012</a:t>
+              <a:t>10/16/2012</a:t>
             </a:fld>
             <a:endParaRPr lang="en-US"/>
           </a:p>
@@ -4999,11 +4960,7 @@
           <a:p>
             <a:r>
               <a:rPr lang="en-US" dirty="0" smtClean="0"/>
-              <a:t>Picking App – </a:t>
-            </a:r>
-            <a:r>
-              <a:rPr lang="en-US" dirty="0" smtClean="0"/>
-              <a:t>Lesson Learned</a:t>
+              <a:t>Picking App – Lesson Learned</a:t>
             </a:r>
             <a:endParaRPr lang="en-US" dirty="0"/>
           </a:p>
@@ -5022,17 +4979,13 @@
         <p:spPr/>
         <p:txBody>
           <a:bodyPr>
-            <a:normAutofit fontScale="85000" lnSpcReduction="10000"/>
+            <a:normAutofit fontScale="85000" lnSpcReduction="20000"/>
           </a:bodyPr>
           <a:lstStyle/>
           <a:p>
             <a:r>
               <a:rPr lang="en-US" dirty="0" smtClean="0"/>
-              <a:t>Based </a:t>
-            </a:r>
-            <a:r>
-              <a:rPr lang="en-US" dirty="0" smtClean="0"/>
-              <a:t>on a </a:t>
+              <a:t>Based on a </a:t>
             </a:r>
             <a:r>
               <a:rPr lang="en-US" b="1" dirty="0" smtClean="0"/>
@@ -5060,6 +5013,30 @@
           <a:p>
             <a:r>
               <a:rPr lang="en-US" dirty="0" smtClean="0"/>
+              <a:t>Have a way to </a:t>
+            </a:r>
+            <a:r>
+              <a:rPr lang="en-US" b="1" dirty="0" smtClean="0"/>
+              <a:t>specify</a:t>
+            </a:r>
+            <a:r>
+              <a:rPr lang="en-US" dirty="0" smtClean="0"/>
+              <a:t> input file on the command line.</a:t>
+            </a:r>
+          </a:p>
+          <a:p>
+            <a:r>
+              <a:rPr lang="en-US" b="1" dirty="0" smtClean="0"/>
+              <a:t>Not </a:t>
+            </a:r>
+            <a:r>
+              <a:rPr lang="en-US" dirty="0" smtClean="0"/>
+              <a:t>fuzzed before.</a:t>
+            </a:r>
+          </a:p>
+          <a:p>
+            <a:r>
+              <a:rPr lang="en-US" dirty="0" smtClean="0"/>
               <a:t>Project is willing to </a:t>
             </a:r>
             <a:r>
@@ -5074,43 +5051,19 @@
           <a:p>
             <a:r>
               <a:rPr lang="en-US" dirty="0" smtClean="0"/>
-              <a:t>Have a way to </a:t>
-            </a:r>
-            <a:r>
-              <a:rPr lang="en-US" b="1" dirty="0" smtClean="0"/>
-              <a:t>specify</a:t>
-            </a:r>
-            <a:r>
-              <a:rPr lang="en-US" dirty="0" smtClean="0"/>
-              <a:t> input file on the command line.</a:t>
-            </a:r>
-          </a:p>
-          <a:p>
-            <a:r>
-              <a:rPr lang="en-US" dirty="0" smtClean="0"/>
-              <a:t>Does it have a bounty?</a:t>
-            </a:r>
-          </a:p>
-          <a:p>
-            <a:r>
-              <a:rPr lang="en-US" dirty="0" smtClean="0"/>
-              <a:t>Small enough app to create a fuzzer of interest.</a:t>
-            </a:r>
-          </a:p>
-          <a:p>
-            <a:r>
-              <a:rPr lang="en-US" b="1" dirty="0" smtClean="0"/>
-              <a:t>Not </a:t>
-            </a:r>
-            <a:r>
-              <a:rPr lang="en-US" dirty="0" smtClean="0"/>
-              <a:t>fuzzed before.</a:t>
-            </a:r>
-          </a:p>
-          <a:p>
-            <a:r>
-              <a:rPr lang="en-US" dirty="0" smtClean="0"/>
               <a:t>Will be fun to do.</a:t>
+            </a:r>
+          </a:p>
+          <a:p>
+            <a:r>
+              <a:rPr lang="en-US" dirty="0" smtClean="0"/>
+              <a:t>(MAYBE) Does it have a bounty?</a:t>
+            </a:r>
+          </a:p>
+          <a:p>
+            <a:r>
+              <a:rPr lang="en-US" dirty="0" smtClean="0"/>
+              <a:t>(MAYBE) Small enough app to create a fuzzer of interest.</a:t>
             </a:r>
           </a:p>
           <a:p>
@@ -5144,7 +5097,7 @@
             <a:fld id="{B42475BE-AF26-418E-94EA-80828A1D4A4F}" type="datetime1">
               <a:rPr lang="en-US" smtClean="0"/>
               <a:pPr/>
-              <a:t>9/13/2012</a:t>
+              <a:t>10/16/2012</a:t>
             </a:fld>
             <a:endParaRPr lang="en-US"/>
           </a:p>
@@ -5262,15 +5215,7 @@
           <a:p>
             <a:r>
               <a:rPr lang="en-US" dirty="0" smtClean="0"/>
-              <a:t>Changed </a:t>
-            </a:r>
-            <a:r>
-              <a:rPr lang="en-US" dirty="0" smtClean="0"/>
-              <a:t>Python </a:t>
-            </a:r>
-            <a:r>
-              <a:rPr lang="en-US" dirty="0" smtClean="0"/>
-              <a:t>code to </a:t>
+              <a:t>Changed Python code to </a:t>
             </a:r>
             <a:r>
               <a:rPr lang="en-US" b="1" dirty="0" smtClean="0"/>
@@ -5290,15 +5235,7 @@
           <a:p>
             <a:r>
               <a:rPr lang="en-US" dirty="0" smtClean="0"/>
-              <a:t>Ran the </a:t>
-            </a:r>
-            <a:r>
-              <a:rPr lang="en-US" dirty="0" smtClean="0"/>
-              <a:t>Python code</a:t>
-            </a:r>
-            <a:r>
-              <a:rPr lang="en-US" dirty="0" smtClean="0"/>
-              <a:t>. Tweeted the code’s parameters. Looked at the results.</a:t>
+              <a:t>Ran the Python code. Tweeted the code’s parameters. Looked at the results.</a:t>
             </a:r>
           </a:p>
           <a:p>
@@ -5531,7 +5468,7 @@
             <a:fld id="{D437141D-792A-4070-A523-5816EF4E2864}" type="datetime1">
               <a:rPr lang="en-US" smtClean="0"/>
               <a:pPr/>
-              <a:t>9/13/2012</a:t>
+              <a:t>10/16/2012</a:t>
             </a:fld>
             <a:endParaRPr lang="en-US"/>
           </a:p>
@@ -5626,8 +5563,27 @@
           <a:p>
             <a:r>
               <a:rPr lang="en-US" dirty="0" smtClean="0"/>
-              <a:t>&lt;&lt; DEMO &gt;&gt;</a:t>
-            </a:r>
+              <a:t>Bring up VM.</a:t>
+            </a:r>
+          </a:p>
+          <a:p>
+            <a:r>
+              <a:rPr lang="en-US" dirty="0" smtClean="0"/>
+              <a:t>Start up Cygwin.</a:t>
+            </a:r>
+          </a:p>
+          <a:p>
+            <a:r>
+              <a:rPr lang="en-US" dirty="0" smtClean="0"/>
+              <a:t>cd PS4-FUZZER</a:t>
+            </a:r>
+          </a:p>
+          <a:p>
+            <a:r>
+              <a:rPr lang="en-US" smtClean="0"/>
+              <a:t>./ps4-code.py</a:t>
+            </a:r>
+            <a:endParaRPr lang="en-US" dirty="0" smtClean="0"/>
           </a:p>
         </p:txBody>
       </p:sp>
@@ -5649,7 +5605,7 @@
             <a:fld id="{4F14D063-41DD-48AB-A602-039008C581E1}" type="datetime1">
               <a:rPr lang="en-US" smtClean="0"/>
               <a:pPr/>
-              <a:t>9/13/2012</a:t>
+              <a:t>10/16/2012</a:t>
             </a:fld>
             <a:endParaRPr lang="en-US"/>
           </a:p>

</xml_diff>